<commit_message>
added course outline slides
</commit_message>
<xml_diff>
--- a/public/Exam Notes/Machine Learning Course - Welcome.pptx
+++ b/public/Exam Notes/Machine Learning Course - Welcome.pptx
@@ -808,7 +808,7 @@
   <p:cSld>
     <p:spTree>
       <p:nvGrpSpPr>
-        <p:cNvPr id="146" name="Shape 146"/>
+        <p:cNvPr id="160" name="Shape 160"/>
         <p:cNvGrpSpPr/>
         <p:nvPr/>
       </p:nvGrpSpPr>
@@ -822,7 +822,7 @@
       </p:grpSpPr>
       <p:sp>
         <p:nvSpPr>
-          <p:cNvPr id="147" name="Google Shape;147;g6bee61c929_0_149:notes"/>
+          <p:cNvPr id="161" name="Google Shape;161;g6bee61c929_0_149:notes"/>
           <p:cNvSpPr/>
           <p:nvPr>
             <p:ph idx="2" type="sldImg"/>
@@ -857,7 +857,7 @@
       </p:sp>
       <p:sp>
         <p:nvSpPr>
-          <p:cNvPr id="148" name="Google Shape;148;g6bee61c929_0_149:notes"/>
+          <p:cNvPr id="162" name="Google Shape;162;g6bee61c929_0_149:notes"/>
           <p:cNvSpPr txBox="1"/>
           <p:nvPr>
             <p:ph idx="1" type="body"/>
@@ -1402,7 +1402,7 @@
   <p:cSld>
     <p:spTree>
       <p:nvGrpSpPr>
-        <p:cNvPr id="114" name="Shape 114"/>
+        <p:cNvPr id="128" name="Shape 128"/>
         <p:cNvGrpSpPr/>
         <p:nvPr/>
       </p:nvGrpSpPr>
@@ -1416,7 +1416,7 @@
       </p:grpSpPr>
       <p:sp>
         <p:nvSpPr>
-          <p:cNvPr id="115" name="Google Shape;115;g6bee61c929_0_161:notes"/>
+          <p:cNvPr id="129" name="Google Shape;129;g6bee61c929_0_161:notes"/>
           <p:cNvSpPr/>
           <p:nvPr>
             <p:ph idx="2" type="sldImg"/>
@@ -1451,7 +1451,7 @@
       </p:sp>
       <p:sp>
         <p:nvSpPr>
-          <p:cNvPr id="116" name="Google Shape;116;g6bee61c929_0_161:notes"/>
+          <p:cNvPr id="130" name="Google Shape;130;g6bee61c929_0_161:notes"/>
           <p:cNvSpPr txBox="1"/>
           <p:nvPr>
             <p:ph idx="1" type="body"/>
@@ -1501,7 +1501,7 @@
   <p:cSld>
     <p:spTree>
       <p:nvGrpSpPr>
-        <p:cNvPr id="124" name="Shape 124"/>
+        <p:cNvPr id="138" name="Shape 138"/>
         <p:cNvGrpSpPr/>
         <p:nvPr/>
       </p:nvGrpSpPr>
@@ -1515,7 +1515,7 @@
       </p:grpSpPr>
       <p:sp>
         <p:nvSpPr>
-          <p:cNvPr id="125" name="Google Shape;125;g6bee61c929_0_126:notes"/>
+          <p:cNvPr id="139" name="Google Shape;139;g6bee61c929_0_126:notes"/>
           <p:cNvSpPr/>
           <p:nvPr>
             <p:ph idx="2" type="sldImg"/>
@@ -1550,7 +1550,7 @@
       </p:sp>
       <p:sp>
         <p:nvSpPr>
-          <p:cNvPr id="126" name="Google Shape;126;g6bee61c929_0_126:notes"/>
+          <p:cNvPr id="140" name="Google Shape;140;g6bee61c929_0_126:notes"/>
           <p:cNvSpPr txBox="1"/>
           <p:nvPr>
             <p:ph idx="1" type="body"/>
@@ -1600,7 +1600,7 @@
   <p:cSld>
     <p:spTree>
       <p:nvGrpSpPr>
-        <p:cNvPr id="134" name="Shape 134"/>
+        <p:cNvPr id="148" name="Shape 148"/>
         <p:cNvGrpSpPr/>
         <p:nvPr/>
       </p:nvGrpSpPr>
@@ -1614,7 +1614,7 @@
       </p:grpSpPr>
       <p:sp>
         <p:nvSpPr>
-          <p:cNvPr id="135" name="Google Shape;135;g6bee61c929_0_137:notes"/>
+          <p:cNvPr id="149" name="Google Shape;149;g6bee61c929_0_137:notes"/>
           <p:cNvSpPr/>
           <p:nvPr>
             <p:ph idx="2" type="sldImg"/>
@@ -1649,7 +1649,7 @@
       </p:sp>
       <p:sp>
         <p:nvSpPr>
-          <p:cNvPr id="136" name="Google Shape;136;g6bee61c929_0_137:notes"/>
+          <p:cNvPr id="150" name="Google Shape;150;g6bee61c929_0_137:notes"/>
           <p:cNvSpPr txBox="1"/>
           <p:nvPr>
             <p:ph idx="1" type="body"/>
@@ -6670,7 +6670,7 @@
   <p:cSld>
     <p:spTree>
       <p:nvGrpSpPr>
-        <p:cNvPr id="149" name="Shape 149"/>
+        <p:cNvPr id="163" name="Shape 163"/>
         <p:cNvGrpSpPr/>
         <p:nvPr/>
       </p:nvGrpSpPr>
@@ -6684,7 +6684,7 @@
       </p:grpSpPr>
       <p:sp>
         <p:nvSpPr>
-          <p:cNvPr id="150" name="Google Shape;150;p22"/>
+          <p:cNvPr id="164" name="Google Shape;164;p22"/>
           <p:cNvSpPr/>
           <p:nvPr/>
         </p:nvSpPr>
@@ -6750,7 +6750,7 @@
       </p:sp>
       <p:sp>
         <p:nvSpPr>
-          <p:cNvPr id="151" name="Google Shape;151;p22"/>
+          <p:cNvPr id="165" name="Google Shape;165;p22"/>
           <p:cNvSpPr/>
           <p:nvPr/>
         </p:nvSpPr>
@@ -6805,7 +6805,7 @@
       </p:sp>
       <p:sp>
         <p:nvSpPr>
-          <p:cNvPr id="152" name="Google Shape;152;p22"/>
+          <p:cNvPr id="166" name="Google Shape;166;p22"/>
           <p:cNvSpPr/>
           <p:nvPr/>
         </p:nvSpPr>
@@ -6864,7 +6864,7 @@
       </p:sp>
       <p:sp>
         <p:nvSpPr>
-          <p:cNvPr id="153" name="Google Shape;153;p22"/>
+          <p:cNvPr id="167" name="Google Shape;167;p22"/>
           <p:cNvSpPr/>
           <p:nvPr/>
         </p:nvSpPr>
@@ -6922,7 +6922,7 @@
       </p:sp>
       <p:pic>
         <p:nvPicPr>
-          <p:cNvPr id="154" name="Google Shape;154;p22"/>
+          <p:cNvPr id="168" name="Google Shape;168;p22"/>
           <p:cNvPicPr preferRelativeResize="0"/>
           <p:nvPr/>
         </p:nvPicPr>
@@ -6950,7 +6950,7 @@
       </p:pic>
       <p:pic>
         <p:nvPicPr>
-          <p:cNvPr id="155" name="Google Shape;155;p22"/>
+          <p:cNvPr id="169" name="Google Shape;169;p22"/>
           <p:cNvPicPr preferRelativeResize="0"/>
           <p:nvPr/>
         </p:nvPicPr>
@@ -8874,8 +8874,8 @@
         </p:blipFill>
         <p:spPr>
           <a:xfrm>
-            <a:off x="943563" y="1914484"/>
-            <a:ext cx="7400925" cy="2514600"/>
+            <a:off x="871525" y="1456700"/>
+            <a:ext cx="6661654" cy="2263400"/>
           </a:xfrm>
           <a:prstGeom prst="rect">
             <a:avLst/>
@@ -8886,11 +8886,1789 @@
           </a:ln>
         </p:spPr>
       </p:pic>
+      <p:sp>
+        <p:nvSpPr>
+          <p:cNvPr id="114" name="Google Shape;114;p18"/>
+          <p:cNvSpPr txBox="1"/>
+          <p:nvPr/>
+        </p:nvSpPr>
+        <p:spPr>
+          <a:xfrm>
+            <a:off x="612125" y="3909525"/>
+            <a:ext cx="2789700" cy="570000"/>
+          </a:xfrm>
+          <a:prstGeom prst="rect">
+            <a:avLst/>
+          </a:prstGeom>
+          <a:noFill/>
+          <a:ln>
+            <a:noFill/>
+          </a:ln>
+        </p:spPr>
+        <p:txBody>
+          <a:bodyPr anchorCtr="0" anchor="t" bIns="91425" lIns="91425" spcFirstLastPara="1" rIns="91425" wrap="square" tIns="91425">
+            <a:noAutofit/>
+          </a:bodyPr>
+          <a:lstStyle/>
+          <a:p>
+            <a:pPr indent="-285750" lvl="0" marL="457200" rtl="0" algn="l">
+              <a:spcBef>
+                <a:spcPts val="0"/>
+              </a:spcBef>
+              <a:spcAft>
+                <a:spcPts val="0"/>
+              </a:spcAft>
+              <a:buSzPts val="900"/>
+              <a:buChar char="●"/>
+            </a:pPr>
+            <a:r>
+              <a:rPr lang="en" sz="900"/>
+              <a:t>Identify and implement data-ingestion and data-transformation solutions</a:t>
+            </a:r>
+            <a:endParaRPr sz="900"/>
+          </a:p>
+        </p:txBody>
+      </p:sp>
+      <p:sp>
+        <p:nvSpPr>
+          <p:cNvPr id="115" name="Google Shape;115;p18"/>
+          <p:cNvSpPr txBox="1"/>
+          <p:nvPr/>
+        </p:nvSpPr>
+        <p:spPr>
+          <a:xfrm>
+            <a:off x="2558700" y="3643900"/>
+            <a:ext cx="2254200" cy="495300"/>
+          </a:xfrm>
+          <a:prstGeom prst="rect">
+            <a:avLst/>
+          </a:prstGeom>
+          <a:noFill/>
+          <a:ln>
+            <a:noFill/>
+          </a:ln>
+        </p:spPr>
+        <p:txBody>
+          <a:bodyPr anchorCtr="0" anchor="t" bIns="91425" lIns="91425" spcFirstLastPara="1" rIns="91425" wrap="square" tIns="91425">
+            <a:noAutofit/>
+          </a:bodyPr>
+          <a:lstStyle/>
+          <a:p>
+            <a:pPr indent="-285750" lvl="0" marL="457200" rtl="0" algn="l">
+              <a:spcBef>
+                <a:spcPts val="0"/>
+              </a:spcBef>
+              <a:spcAft>
+                <a:spcPts val="0"/>
+              </a:spcAft>
+              <a:buSzPts val="900"/>
+              <a:buChar char="●"/>
+            </a:pPr>
+            <a:r>
+              <a:rPr lang="en" sz="900"/>
+              <a:t>Sanitize and prepare data for modeling</a:t>
+            </a:r>
+            <a:endParaRPr sz="900"/>
+          </a:p>
+        </p:txBody>
+      </p:sp>
+      <p:sp>
+        <p:nvSpPr>
+          <p:cNvPr id="116" name="Google Shape;116;p18"/>
+          <p:cNvSpPr txBox="1"/>
+          <p:nvPr/>
+        </p:nvSpPr>
+        <p:spPr>
+          <a:xfrm>
+            <a:off x="2546825" y="4023075"/>
+            <a:ext cx="2254200" cy="495300"/>
+          </a:xfrm>
+          <a:prstGeom prst="rect">
+            <a:avLst/>
+          </a:prstGeom>
+          <a:noFill/>
+          <a:ln>
+            <a:noFill/>
+          </a:ln>
+        </p:spPr>
+        <p:txBody>
+          <a:bodyPr anchorCtr="0" anchor="t" bIns="91425" lIns="91425" spcFirstLastPara="1" rIns="91425" wrap="square" tIns="91425">
+            <a:noAutofit/>
+          </a:bodyPr>
+          <a:lstStyle/>
+          <a:p>
+            <a:pPr indent="-285750" lvl="0" marL="457200" rtl="0" algn="l">
+              <a:spcBef>
+                <a:spcPts val="0"/>
+              </a:spcBef>
+              <a:spcAft>
+                <a:spcPts val="0"/>
+              </a:spcAft>
+              <a:buSzPts val="900"/>
+              <a:buChar char="●"/>
+            </a:pPr>
+            <a:r>
+              <a:rPr lang="en" sz="900"/>
+              <a:t>Perform feature engineering</a:t>
+            </a:r>
+            <a:endParaRPr sz="900"/>
+          </a:p>
+        </p:txBody>
+      </p:sp>
+      <p:sp>
+        <p:nvSpPr>
+          <p:cNvPr id="117" name="Google Shape;117;p18"/>
+          <p:cNvSpPr txBox="1"/>
+          <p:nvPr/>
+        </p:nvSpPr>
+        <p:spPr>
+          <a:xfrm>
+            <a:off x="2546834" y="4282750"/>
+            <a:ext cx="2254200" cy="495300"/>
+          </a:xfrm>
+          <a:prstGeom prst="rect">
+            <a:avLst/>
+          </a:prstGeom>
+          <a:noFill/>
+          <a:ln>
+            <a:noFill/>
+          </a:ln>
+        </p:spPr>
+        <p:txBody>
+          <a:bodyPr anchorCtr="0" anchor="t" bIns="91425" lIns="91425" spcFirstLastPara="1" rIns="91425" wrap="square" tIns="91425">
+            <a:noAutofit/>
+          </a:bodyPr>
+          <a:lstStyle/>
+          <a:p>
+            <a:pPr indent="-285750" lvl="0" marL="457200" rtl="0" algn="l">
+              <a:spcBef>
+                <a:spcPts val="0"/>
+              </a:spcBef>
+              <a:spcAft>
+                <a:spcPts val="0"/>
+              </a:spcAft>
+              <a:buSzPts val="900"/>
+              <a:buChar char="●"/>
+            </a:pPr>
+            <a:r>
+              <a:rPr lang="en" sz="900"/>
+              <a:t>Analyze and visualize data for machine learning</a:t>
+            </a:r>
+            <a:endParaRPr sz="900"/>
+          </a:p>
+        </p:txBody>
+      </p:sp>
+      <p:sp>
+        <p:nvSpPr>
+          <p:cNvPr id="118" name="Google Shape;118;p18"/>
+          <p:cNvSpPr txBox="1"/>
+          <p:nvPr/>
+        </p:nvSpPr>
+        <p:spPr>
+          <a:xfrm>
+            <a:off x="4040149" y="3643900"/>
+            <a:ext cx="2586600" cy="495300"/>
+          </a:xfrm>
+          <a:prstGeom prst="rect">
+            <a:avLst/>
+          </a:prstGeom>
+          <a:noFill/>
+          <a:ln>
+            <a:noFill/>
+          </a:ln>
+        </p:spPr>
+        <p:txBody>
+          <a:bodyPr anchorCtr="0" anchor="t" bIns="91425" lIns="91425" spcFirstLastPara="1" rIns="91425" wrap="square" tIns="91425">
+            <a:noAutofit/>
+          </a:bodyPr>
+          <a:lstStyle/>
+          <a:p>
+            <a:pPr indent="-285750" lvl="0" marL="457200" rtl="0" algn="l">
+              <a:spcBef>
+                <a:spcPts val="0"/>
+              </a:spcBef>
+              <a:spcAft>
+                <a:spcPts val="0"/>
+              </a:spcAft>
+              <a:buSzPts val="900"/>
+              <a:buChar char="●"/>
+            </a:pPr>
+            <a:r>
+              <a:rPr lang="en" sz="900"/>
+              <a:t>Frame business problems as machine learning problems</a:t>
+            </a:r>
+            <a:endParaRPr sz="900"/>
+          </a:p>
+        </p:txBody>
+      </p:sp>
+      <p:sp>
+        <p:nvSpPr>
+          <p:cNvPr id="119" name="Google Shape;119;p18"/>
+          <p:cNvSpPr txBox="1"/>
+          <p:nvPr/>
+        </p:nvSpPr>
+        <p:spPr>
+          <a:xfrm>
+            <a:off x="4027301" y="3946875"/>
+            <a:ext cx="2586600" cy="495300"/>
+          </a:xfrm>
+          <a:prstGeom prst="rect">
+            <a:avLst/>
+          </a:prstGeom>
+          <a:noFill/>
+          <a:ln>
+            <a:noFill/>
+          </a:ln>
+        </p:spPr>
+        <p:txBody>
+          <a:bodyPr anchorCtr="0" anchor="t" bIns="91425" lIns="91425" spcFirstLastPara="1" rIns="91425" wrap="square" tIns="91425">
+            <a:noAutofit/>
+          </a:bodyPr>
+          <a:lstStyle/>
+          <a:p>
+            <a:pPr indent="-285750" lvl="0" marL="457200" rtl="0" algn="l">
+              <a:spcBef>
+                <a:spcPts val="0"/>
+              </a:spcBef>
+              <a:spcAft>
+                <a:spcPts val="0"/>
+              </a:spcAft>
+              <a:buSzPts val="900"/>
+              <a:buChar char="●"/>
+            </a:pPr>
+            <a:r>
+              <a:rPr lang="en" sz="900"/>
+              <a:t>Select the appropriate model(s) for a given machine learning problem</a:t>
+            </a:r>
+            <a:endParaRPr sz="900"/>
+          </a:p>
+        </p:txBody>
+      </p:sp>
+      <p:sp>
+        <p:nvSpPr>
+          <p:cNvPr id="120" name="Google Shape;120;p18"/>
+          <p:cNvSpPr txBox="1"/>
+          <p:nvPr/>
+        </p:nvSpPr>
+        <p:spPr>
+          <a:xfrm>
+            <a:off x="4040151" y="4282750"/>
+            <a:ext cx="2586600" cy="495300"/>
+          </a:xfrm>
+          <a:prstGeom prst="rect">
+            <a:avLst/>
+          </a:prstGeom>
+          <a:noFill/>
+          <a:ln>
+            <a:noFill/>
+          </a:ln>
+        </p:spPr>
+        <p:txBody>
+          <a:bodyPr anchorCtr="0" anchor="t" bIns="91425" lIns="91425" spcFirstLastPara="1" rIns="91425" wrap="square" tIns="91425">
+            <a:noAutofit/>
+          </a:bodyPr>
+          <a:lstStyle/>
+          <a:p>
+            <a:pPr indent="-285750" lvl="0" marL="457200" rtl="0" algn="l">
+              <a:spcBef>
+                <a:spcPts val="0"/>
+              </a:spcBef>
+              <a:spcAft>
+                <a:spcPts val="0"/>
+              </a:spcAft>
+              <a:buSzPts val="900"/>
+              <a:buChar char="●"/>
+            </a:pPr>
+            <a:r>
+              <a:rPr lang="en" sz="900"/>
+              <a:t>Train machine learning models</a:t>
+            </a:r>
+            <a:endParaRPr sz="900"/>
+          </a:p>
+        </p:txBody>
+      </p:sp>
+      <p:sp>
+        <p:nvSpPr>
+          <p:cNvPr id="121" name="Google Shape;121;p18"/>
+          <p:cNvSpPr txBox="1"/>
+          <p:nvPr/>
+        </p:nvSpPr>
+        <p:spPr>
+          <a:xfrm>
+            <a:off x="4040150" y="4518375"/>
+            <a:ext cx="2586600" cy="335100"/>
+          </a:xfrm>
+          <a:prstGeom prst="rect">
+            <a:avLst/>
+          </a:prstGeom>
+          <a:noFill/>
+          <a:ln>
+            <a:noFill/>
+          </a:ln>
+        </p:spPr>
+        <p:txBody>
+          <a:bodyPr anchorCtr="0" anchor="t" bIns="91425" lIns="91425" spcFirstLastPara="1" rIns="91425" wrap="square" tIns="91425">
+            <a:noAutofit/>
+          </a:bodyPr>
+          <a:lstStyle/>
+          <a:p>
+            <a:pPr indent="-285750" lvl="0" marL="457200" rtl="0" algn="l">
+              <a:spcBef>
+                <a:spcPts val="0"/>
+              </a:spcBef>
+              <a:spcAft>
+                <a:spcPts val="0"/>
+              </a:spcAft>
+              <a:buSzPts val="900"/>
+              <a:buChar char="●"/>
+            </a:pPr>
+            <a:r>
+              <a:rPr lang="en" sz="900"/>
+              <a:t>Perform hyperparameter optimization</a:t>
+            </a:r>
+            <a:endParaRPr sz="900"/>
+          </a:p>
+        </p:txBody>
+      </p:sp>
+      <p:sp>
+        <p:nvSpPr>
+          <p:cNvPr id="122" name="Google Shape;122;p18"/>
+          <p:cNvSpPr txBox="1"/>
+          <p:nvPr/>
+        </p:nvSpPr>
+        <p:spPr>
+          <a:xfrm>
+            <a:off x="4040150" y="4770650"/>
+            <a:ext cx="2586600" cy="335100"/>
+          </a:xfrm>
+          <a:prstGeom prst="rect">
+            <a:avLst/>
+          </a:prstGeom>
+          <a:noFill/>
+          <a:ln>
+            <a:noFill/>
+          </a:ln>
+        </p:spPr>
+        <p:txBody>
+          <a:bodyPr anchorCtr="0" anchor="t" bIns="91425" lIns="91425" spcFirstLastPara="1" rIns="91425" wrap="square" tIns="91425">
+            <a:noAutofit/>
+          </a:bodyPr>
+          <a:lstStyle/>
+          <a:p>
+            <a:pPr indent="-285750" lvl="0" marL="457200" rtl="0" algn="l">
+              <a:spcBef>
+                <a:spcPts val="0"/>
+              </a:spcBef>
+              <a:spcAft>
+                <a:spcPts val="0"/>
+              </a:spcAft>
+              <a:buSzPts val="900"/>
+              <a:buChar char="●"/>
+            </a:pPr>
+            <a:r>
+              <a:rPr lang="en" sz="900"/>
+              <a:t>Evaluate machine learning models</a:t>
+            </a:r>
+            <a:endParaRPr sz="900"/>
+          </a:p>
+        </p:txBody>
+      </p:sp>
+      <p:sp>
+        <p:nvSpPr>
+          <p:cNvPr id="123" name="Google Shape;123;p18"/>
+          <p:cNvSpPr txBox="1"/>
+          <p:nvPr/>
+        </p:nvSpPr>
+        <p:spPr>
+          <a:xfrm>
+            <a:off x="612125" y="3618400"/>
+            <a:ext cx="2995500" cy="468600"/>
+          </a:xfrm>
+          <a:prstGeom prst="rect">
+            <a:avLst/>
+          </a:prstGeom>
+          <a:noFill/>
+          <a:ln>
+            <a:noFill/>
+          </a:ln>
+        </p:spPr>
+        <p:txBody>
+          <a:bodyPr anchorCtr="0" anchor="t" bIns="91425" lIns="91425" spcFirstLastPara="1" rIns="91425" wrap="square" tIns="91425">
+            <a:noAutofit/>
+          </a:bodyPr>
+          <a:lstStyle/>
+          <a:p>
+            <a:pPr indent="-285750" lvl="0" marL="457200" rtl="0" algn="l">
+              <a:spcBef>
+                <a:spcPts val="0"/>
+              </a:spcBef>
+              <a:spcAft>
+                <a:spcPts val="0"/>
+              </a:spcAft>
+              <a:buSzPts val="900"/>
+              <a:buChar char="●"/>
+            </a:pPr>
+            <a:r>
+              <a:rPr lang="en" sz="900"/>
+              <a:t>Create data repositories for machine learning</a:t>
+            </a:r>
+            <a:endParaRPr sz="900"/>
+          </a:p>
+        </p:txBody>
+      </p:sp>
+      <p:sp>
+        <p:nvSpPr>
+          <p:cNvPr id="124" name="Google Shape;124;p18"/>
+          <p:cNvSpPr txBox="1"/>
+          <p:nvPr/>
+        </p:nvSpPr>
+        <p:spPr>
+          <a:xfrm>
+            <a:off x="5653226" y="3657250"/>
+            <a:ext cx="3424800" cy="468600"/>
+          </a:xfrm>
+          <a:prstGeom prst="rect">
+            <a:avLst/>
+          </a:prstGeom>
+          <a:noFill/>
+          <a:ln>
+            <a:noFill/>
+          </a:ln>
+        </p:spPr>
+        <p:txBody>
+          <a:bodyPr anchorCtr="0" anchor="t" bIns="91425" lIns="91425" spcFirstLastPara="1" rIns="91425" wrap="square" tIns="91425">
+            <a:noAutofit/>
+          </a:bodyPr>
+          <a:lstStyle/>
+          <a:p>
+            <a:pPr indent="-285750" lvl="0" marL="457200" rtl="0" algn="l">
+              <a:spcBef>
+                <a:spcPts val="0"/>
+              </a:spcBef>
+              <a:spcAft>
+                <a:spcPts val="0"/>
+              </a:spcAft>
+              <a:buSzPts val="900"/>
+              <a:buChar char="●"/>
+            </a:pPr>
+            <a:r>
+              <a:rPr lang="en" sz="900"/>
+              <a:t>Build machine learning solutions for performance, availability, scalability, resiliency, and fault tolerance</a:t>
+            </a:r>
+            <a:endParaRPr sz="900"/>
+          </a:p>
+        </p:txBody>
+      </p:sp>
+      <p:sp>
+        <p:nvSpPr>
+          <p:cNvPr id="125" name="Google Shape;125;p18"/>
+          <p:cNvSpPr txBox="1"/>
+          <p:nvPr/>
+        </p:nvSpPr>
+        <p:spPr>
+          <a:xfrm>
+            <a:off x="5653226" y="4011075"/>
+            <a:ext cx="3424800" cy="468600"/>
+          </a:xfrm>
+          <a:prstGeom prst="rect">
+            <a:avLst/>
+          </a:prstGeom>
+          <a:noFill/>
+          <a:ln>
+            <a:noFill/>
+          </a:ln>
+        </p:spPr>
+        <p:txBody>
+          <a:bodyPr anchorCtr="0" anchor="t" bIns="91425" lIns="91425" spcFirstLastPara="1" rIns="91425" wrap="square" tIns="91425">
+            <a:noAutofit/>
+          </a:bodyPr>
+          <a:lstStyle/>
+          <a:p>
+            <a:pPr indent="-285750" lvl="0" marL="457200" rtl="0" algn="l">
+              <a:spcBef>
+                <a:spcPts val="0"/>
+              </a:spcBef>
+              <a:spcAft>
+                <a:spcPts val="0"/>
+              </a:spcAft>
+              <a:buSzPts val="900"/>
+              <a:buChar char="●"/>
+            </a:pPr>
+            <a:r>
+              <a:rPr lang="en" sz="900"/>
+              <a:t>Recommend and implement the appropriate machine learning services and features for a given problem</a:t>
+            </a:r>
+            <a:endParaRPr sz="900"/>
+          </a:p>
+        </p:txBody>
+      </p:sp>
+      <p:sp>
+        <p:nvSpPr>
+          <p:cNvPr id="126" name="Google Shape;126;p18"/>
+          <p:cNvSpPr txBox="1"/>
+          <p:nvPr/>
+        </p:nvSpPr>
+        <p:spPr>
+          <a:xfrm>
+            <a:off x="5653226" y="4376500"/>
+            <a:ext cx="3424800" cy="468600"/>
+          </a:xfrm>
+          <a:prstGeom prst="rect">
+            <a:avLst/>
+          </a:prstGeom>
+          <a:noFill/>
+          <a:ln>
+            <a:noFill/>
+          </a:ln>
+        </p:spPr>
+        <p:txBody>
+          <a:bodyPr anchorCtr="0" anchor="t" bIns="91425" lIns="91425" spcFirstLastPara="1" rIns="91425" wrap="square" tIns="91425">
+            <a:noAutofit/>
+          </a:bodyPr>
+          <a:lstStyle/>
+          <a:p>
+            <a:pPr indent="-285750" lvl="0" marL="457200" rtl="0" algn="l">
+              <a:spcBef>
+                <a:spcPts val="0"/>
+              </a:spcBef>
+              <a:spcAft>
+                <a:spcPts val="0"/>
+              </a:spcAft>
+              <a:buSzPts val="900"/>
+              <a:buChar char="●"/>
+            </a:pPr>
+            <a:r>
+              <a:rPr lang="en" sz="900"/>
+              <a:t>Apply basic AWS security practices to machine learning solutions</a:t>
+            </a:r>
+            <a:endParaRPr sz="900"/>
+          </a:p>
+        </p:txBody>
+      </p:sp>
+      <p:sp>
+        <p:nvSpPr>
+          <p:cNvPr id="127" name="Google Shape;127;p18"/>
+          <p:cNvSpPr txBox="1"/>
+          <p:nvPr/>
+        </p:nvSpPr>
+        <p:spPr>
+          <a:xfrm>
+            <a:off x="5653225" y="4668950"/>
+            <a:ext cx="2789700" cy="495300"/>
+          </a:xfrm>
+          <a:prstGeom prst="rect">
+            <a:avLst/>
+          </a:prstGeom>
+          <a:noFill/>
+          <a:ln>
+            <a:noFill/>
+          </a:ln>
+        </p:spPr>
+        <p:txBody>
+          <a:bodyPr anchorCtr="0" anchor="t" bIns="91425" lIns="91425" spcFirstLastPara="1" rIns="91425" wrap="square" tIns="91425">
+            <a:noAutofit/>
+          </a:bodyPr>
+          <a:lstStyle/>
+          <a:p>
+            <a:pPr indent="-285750" lvl="0" marL="457200" rtl="0" algn="l">
+              <a:spcBef>
+                <a:spcPts val="0"/>
+              </a:spcBef>
+              <a:spcAft>
+                <a:spcPts val="0"/>
+              </a:spcAft>
+              <a:buSzPts val="900"/>
+              <a:buChar char="●"/>
+            </a:pPr>
+            <a:r>
+              <a:rPr lang="en" sz="900"/>
+              <a:t>Deploy and operationalize machine learning solutions</a:t>
+            </a:r>
+            <a:endParaRPr sz="900"/>
+          </a:p>
+        </p:txBody>
+      </p:sp>
     </p:spTree>
   </p:cSld>
   <p:clrMapOvr>
     <a:masterClrMapping/>
   </p:clrMapOvr>
+  <p:timing>
+    <p:tnLst>
+      <p:par>
+        <p:cTn dur="indefinite" nodeType="tmRoot" restart="never">
+          <p:childTnLst>
+            <p:seq concurrent="1" nextAc="seek">
+              <p:cTn dur="indefinite" id="2" nodeType="mainSeq">
+                <p:childTnLst>
+                  <p:par>
+                    <p:cTn fill="hold">
+                      <p:stCondLst>
+                        <p:cond delay="indefinite"/>
+                      </p:stCondLst>
+                      <p:childTnLst>
+                        <p:par>
+                          <p:cTn fill="hold">
+                            <p:stCondLst>
+                              <p:cond delay="0"/>
+                            </p:stCondLst>
+                            <p:childTnLst>
+                              <p:par>
+                                <p:cTn fill="hold" nodeType="clickEffect" presetClass="entr" presetID="10" presetSubtype="0">
+                                  <p:stCondLst>
+                                    <p:cond delay="0"/>
+                                  </p:stCondLst>
+                                  <p:childTnLst>
+                                    <p:set>
+                                      <p:cBhvr>
+                                        <p:cTn dur="1" fill="hold">
+                                          <p:stCondLst>
+                                            <p:cond delay="0"/>
+                                          </p:stCondLst>
+                                        </p:cTn>
+                                        <p:tgtEl>
+                                          <p:spTgt spid="123"/>
+                                        </p:tgtEl>
+                                        <p:attrNameLst>
+                                          <p:attrName>style.visibility</p:attrName>
+                                        </p:attrNameLst>
+                                      </p:cBhvr>
+                                      <p:to>
+                                        <p:strVal val="visible"/>
+                                      </p:to>
+                                    </p:set>
+                                    <p:animEffect filter="fade" transition="in">
+                                      <p:cBhvr>
+                                        <p:cTn dur="1000"/>
+                                        <p:tgtEl>
+                                          <p:spTgt spid="123"/>
+                                        </p:tgtEl>
+                                      </p:cBhvr>
+                                    </p:animEffect>
+                                  </p:childTnLst>
+                                </p:cTn>
+                              </p:par>
+                            </p:childTnLst>
+                          </p:cTn>
+                        </p:par>
+                      </p:childTnLst>
+                    </p:cTn>
+                  </p:par>
+                  <p:par>
+                    <p:cTn fill="hold">
+                      <p:stCondLst>
+                        <p:cond delay="indefinite"/>
+                      </p:stCondLst>
+                      <p:childTnLst>
+                        <p:par>
+                          <p:cTn fill="hold">
+                            <p:stCondLst>
+                              <p:cond delay="0"/>
+                            </p:stCondLst>
+                            <p:childTnLst>
+                              <p:par>
+                                <p:cTn fill="hold" nodeType="clickEffect" presetClass="entr" presetID="10" presetSubtype="0">
+                                  <p:stCondLst>
+                                    <p:cond delay="0"/>
+                                  </p:stCondLst>
+                                  <p:childTnLst>
+                                    <p:set>
+                                      <p:cBhvr>
+                                        <p:cTn dur="1" fill="hold">
+                                          <p:stCondLst>
+                                            <p:cond delay="0"/>
+                                          </p:stCondLst>
+                                        </p:cTn>
+                                        <p:tgtEl>
+                                          <p:spTgt spid="114"/>
+                                        </p:tgtEl>
+                                        <p:attrNameLst>
+                                          <p:attrName>style.visibility</p:attrName>
+                                        </p:attrNameLst>
+                                      </p:cBhvr>
+                                      <p:to>
+                                        <p:strVal val="visible"/>
+                                      </p:to>
+                                    </p:set>
+                                    <p:animEffect filter="fade" transition="in">
+                                      <p:cBhvr>
+                                        <p:cTn dur="1000"/>
+                                        <p:tgtEl>
+                                          <p:spTgt spid="114"/>
+                                        </p:tgtEl>
+                                      </p:cBhvr>
+                                    </p:animEffect>
+                                  </p:childTnLst>
+                                </p:cTn>
+                              </p:par>
+                            </p:childTnLst>
+                          </p:cTn>
+                        </p:par>
+                      </p:childTnLst>
+                    </p:cTn>
+                  </p:par>
+                  <p:par>
+                    <p:cTn fill="hold">
+                      <p:stCondLst>
+                        <p:cond delay="indefinite"/>
+                      </p:stCondLst>
+                      <p:childTnLst>
+                        <p:par>
+                          <p:cTn fill="hold">
+                            <p:stCondLst>
+                              <p:cond delay="0"/>
+                            </p:stCondLst>
+                            <p:childTnLst>
+                              <p:par>
+                                <p:cTn fill="hold" nodeType="clickEffect" presetClass="exit" presetID="10" presetSubtype="0">
+                                  <p:stCondLst>
+                                    <p:cond delay="0"/>
+                                  </p:stCondLst>
+                                  <p:childTnLst>
+                                    <p:animEffect filter="fade" transition="out">
+                                      <p:cBhvr>
+                                        <p:cTn dur="1000"/>
+                                        <p:tgtEl>
+                                          <p:spTgt spid="123"/>
+                                        </p:tgtEl>
+                                      </p:cBhvr>
+                                    </p:animEffect>
+                                    <p:set>
+                                      <p:cBhvr>
+                                        <p:cTn dur="1" fill="hold">
+                                          <p:stCondLst>
+                                            <p:cond delay="1000"/>
+                                          </p:stCondLst>
+                                        </p:cTn>
+                                        <p:tgtEl>
+                                          <p:spTgt spid="123"/>
+                                        </p:tgtEl>
+                                        <p:attrNameLst>
+                                          <p:attrName>style.visibility</p:attrName>
+                                        </p:attrNameLst>
+                                      </p:cBhvr>
+                                      <p:to>
+                                        <p:strVal val="hidden"/>
+                                      </p:to>
+                                    </p:set>
+                                  </p:childTnLst>
+                                </p:cTn>
+                              </p:par>
+                              <p:par>
+                                <p:cTn fill="hold" nodeType="withEffect" presetClass="exit" presetID="10" presetSubtype="0">
+                                  <p:stCondLst>
+                                    <p:cond delay="0"/>
+                                  </p:stCondLst>
+                                  <p:childTnLst>
+                                    <p:animEffect filter="fade" transition="out">
+                                      <p:cBhvr>
+                                        <p:cTn dur="1000"/>
+                                        <p:tgtEl>
+                                          <p:spTgt spid="114"/>
+                                        </p:tgtEl>
+                                      </p:cBhvr>
+                                    </p:animEffect>
+                                    <p:set>
+                                      <p:cBhvr>
+                                        <p:cTn dur="1" fill="hold">
+                                          <p:stCondLst>
+                                            <p:cond delay="1000"/>
+                                          </p:stCondLst>
+                                        </p:cTn>
+                                        <p:tgtEl>
+                                          <p:spTgt spid="114"/>
+                                        </p:tgtEl>
+                                        <p:attrNameLst>
+                                          <p:attrName>style.visibility</p:attrName>
+                                        </p:attrNameLst>
+                                      </p:cBhvr>
+                                      <p:to>
+                                        <p:strVal val="hidden"/>
+                                      </p:to>
+                                    </p:set>
+                                  </p:childTnLst>
+                                </p:cTn>
+                              </p:par>
+                            </p:childTnLst>
+                          </p:cTn>
+                        </p:par>
+                      </p:childTnLst>
+                    </p:cTn>
+                  </p:par>
+                  <p:par>
+                    <p:cTn fill="hold">
+                      <p:stCondLst>
+                        <p:cond delay="indefinite"/>
+                      </p:stCondLst>
+                      <p:childTnLst>
+                        <p:par>
+                          <p:cTn fill="hold">
+                            <p:stCondLst>
+                              <p:cond delay="0"/>
+                            </p:stCondLst>
+                            <p:childTnLst>
+                              <p:par>
+                                <p:cTn fill="hold" nodeType="clickEffect" presetClass="entr" presetID="10" presetSubtype="0">
+                                  <p:stCondLst>
+                                    <p:cond delay="0"/>
+                                  </p:stCondLst>
+                                  <p:childTnLst>
+                                    <p:set>
+                                      <p:cBhvr>
+                                        <p:cTn dur="1" fill="hold">
+                                          <p:stCondLst>
+                                            <p:cond delay="0"/>
+                                          </p:stCondLst>
+                                        </p:cTn>
+                                        <p:tgtEl>
+                                          <p:spTgt spid="115"/>
+                                        </p:tgtEl>
+                                        <p:attrNameLst>
+                                          <p:attrName>style.visibility</p:attrName>
+                                        </p:attrNameLst>
+                                      </p:cBhvr>
+                                      <p:to>
+                                        <p:strVal val="visible"/>
+                                      </p:to>
+                                    </p:set>
+                                    <p:animEffect filter="fade" transition="in">
+                                      <p:cBhvr>
+                                        <p:cTn dur="1000"/>
+                                        <p:tgtEl>
+                                          <p:spTgt spid="115"/>
+                                        </p:tgtEl>
+                                      </p:cBhvr>
+                                    </p:animEffect>
+                                  </p:childTnLst>
+                                </p:cTn>
+                              </p:par>
+                            </p:childTnLst>
+                          </p:cTn>
+                        </p:par>
+                      </p:childTnLst>
+                    </p:cTn>
+                  </p:par>
+                  <p:par>
+                    <p:cTn fill="hold">
+                      <p:stCondLst>
+                        <p:cond delay="indefinite"/>
+                      </p:stCondLst>
+                      <p:childTnLst>
+                        <p:par>
+                          <p:cTn fill="hold">
+                            <p:stCondLst>
+                              <p:cond delay="0"/>
+                            </p:stCondLst>
+                            <p:childTnLst>
+                              <p:par>
+                                <p:cTn fill="hold" nodeType="clickEffect" presetClass="entr" presetID="10" presetSubtype="0">
+                                  <p:stCondLst>
+                                    <p:cond delay="0"/>
+                                  </p:stCondLst>
+                                  <p:childTnLst>
+                                    <p:set>
+                                      <p:cBhvr>
+                                        <p:cTn dur="1" fill="hold">
+                                          <p:stCondLst>
+                                            <p:cond delay="0"/>
+                                          </p:stCondLst>
+                                        </p:cTn>
+                                        <p:tgtEl>
+                                          <p:spTgt spid="116"/>
+                                        </p:tgtEl>
+                                        <p:attrNameLst>
+                                          <p:attrName>style.visibility</p:attrName>
+                                        </p:attrNameLst>
+                                      </p:cBhvr>
+                                      <p:to>
+                                        <p:strVal val="visible"/>
+                                      </p:to>
+                                    </p:set>
+                                    <p:animEffect filter="fade" transition="in">
+                                      <p:cBhvr>
+                                        <p:cTn dur="1000"/>
+                                        <p:tgtEl>
+                                          <p:spTgt spid="116"/>
+                                        </p:tgtEl>
+                                      </p:cBhvr>
+                                    </p:animEffect>
+                                  </p:childTnLst>
+                                </p:cTn>
+                              </p:par>
+                            </p:childTnLst>
+                          </p:cTn>
+                        </p:par>
+                      </p:childTnLst>
+                    </p:cTn>
+                  </p:par>
+                  <p:par>
+                    <p:cTn fill="hold">
+                      <p:stCondLst>
+                        <p:cond delay="indefinite"/>
+                      </p:stCondLst>
+                      <p:childTnLst>
+                        <p:par>
+                          <p:cTn fill="hold">
+                            <p:stCondLst>
+                              <p:cond delay="0"/>
+                            </p:stCondLst>
+                            <p:childTnLst>
+                              <p:par>
+                                <p:cTn fill="hold" nodeType="clickEffect" presetClass="entr" presetID="10" presetSubtype="0">
+                                  <p:stCondLst>
+                                    <p:cond delay="0"/>
+                                  </p:stCondLst>
+                                  <p:childTnLst>
+                                    <p:set>
+                                      <p:cBhvr>
+                                        <p:cTn dur="1" fill="hold">
+                                          <p:stCondLst>
+                                            <p:cond delay="0"/>
+                                          </p:stCondLst>
+                                        </p:cTn>
+                                        <p:tgtEl>
+                                          <p:spTgt spid="117"/>
+                                        </p:tgtEl>
+                                        <p:attrNameLst>
+                                          <p:attrName>style.visibility</p:attrName>
+                                        </p:attrNameLst>
+                                      </p:cBhvr>
+                                      <p:to>
+                                        <p:strVal val="visible"/>
+                                      </p:to>
+                                    </p:set>
+                                    <p:animEffect filter="fade" transition="in">
+                                      <p:cBhvr>
+                                        <p:cTn dur="1000"/>
+                                        <p:tgtEl>
+                                          <p:spTgt spid="117"/>
+                                        </p:tgtEl>
+                                      </p:cBhvr>
+                                    </p:animEffect>
+                                  </p:childTnLst>
+                                </p:cTn>
+                              </p:par>
+                            </p:childTnLst>
+                          </p:cTn>
+                        </p:par>
+                      </p:childTnLst>
+                    </p:cTn>
+                  </p:par>
+                  <p:par>
+                    <p:cTn fill="hold">
+                      <p:stCondLst>
+                        <p:cond delay="indefinite"/>
+                      </p:stCondLst>
+                      <p:childTnLst>
+                        <p:par>
+                          <p:cTn fill="hold">
+                            <p:stCondLst>
+                              <p:cond delay="0"/>
+                            </p:stCondLst>
+                            <p:childTnLst>
+                              <p:par>
+                                <p:cTn fill="hold" nodeType="clickEffect" presetClass="exit" presetID="10" presetSubtype="0">
+                                  <p:stCondLst>
+                                    <p:cond delay="0"/>
+                                  </p:stCondLst>
+                                  <p:childTnLst>
+                                    <p:animEffect filter="fade" transition="out">
+                                      <p:cBhvr>
+                                        <p:cTn dur="1000"/>
+                                        <p:tgtEl>
+                                          <p:spTgt spid="115"/>
+                                        </p:tgtEl>
+                                      </p:cBhvr>
+                                    </p:animEffect>
+                                    <p:set>
+                                      <p:cBhvr>
+                                        <p:cTn dur="1" fill="hold">
+                                          <p:stCondLst>
+                                            <p:cond delay="1000"/>
+                                          </p:stCondLst>
+                                        </p:cTn>
+                                        <p:tgtEl>
+                                          <p:spTgt spid="115"/>
+                                        </p:tgtEl>
+                                        <p:attrNameLst>
+                                          <p:attrName>style.visibility</p:attrName>
+                                        </p:attrNameLst>
+                                      </p:cBhvr>
+                                      <p:to>
+                                        <p:strVal val="hidden"/>
+                                      </p:to>
+                                    </p:set>
+                                  </p:childTnLst>
+                                </p:cTn>
+                              </p:par>
+                              <p:par>
+                                <p:cTn fill="hold" nodeType="withEffect" presetClass="exit" presetID="10" presetSubtype="0">
+                                  <p:stCondLst>
+                                    <p:cond delay="0"/>
+                                  </p:stCondLst>
+                                  <p:childTnLst>
+                                    <p:animEffect filter="fade" transition="out">
+                                      <p:cBhvr>
+                                        <p:cTn dur="1000"/>
+                                        <p:tgtEl>
+                                          <p:spTgt spid="116"/>
+                                        </p:tgtEl>
+                                      </p:cBhvr>
+                                    </p:animEffect>
+                                    <p:set>
+                                      <p:cBhvr>
+                                        <p:cTn dur="1" fill="hold">
+                                          <p:stCondLst>
+                                            <p:cond delay="1000"/>
+                                          </p:stCondLst>
+                                        </p:cTn>
+                                        <p:tgtEl>
+                                          <p:spTgt spid="116"/>
+                                        </p:tgtEl>
+                                        <p:attrNameLst>
+                                          <p:attrName>style.visibility</p:attrName>
+                                        </p:attrNameLst>
+                                      </p:cBhvr>
+                                      <p:to>
+                                        <p:strVal val="hidden"/>
+                                      </p:to>
+                                    </p:set>
+                                  </p:childTnLst>
+                                </p:cTn>
+                              </p:par>
+                              <p:par>
+                                <p:cTn fill="hold" nodeType="withEffect" presetClass="exit" presetID="10" presetSubtype="0">
+                                  <p:stCondLst>
+                                    <p:cond delay="0"/>
+                                  </p:stCondLst>
+                                  <p:childTnLst>
+                                    <p:animEffect filter="fade" transition="out">
+                                      <p:cBhvr>
+                                        <p:cTn dur="1000"/>
+                                        <p:tgtEl>
+                                          <p:spTgt spid="117"/>
+                                        </p:tgtEl>
+                                      </p:cBhvr>
+                                    </p:animEffect>
+                                    <p:set>
+                                      <p:cBhvr>
+                                        <p:cTn dur="1" fill="hold">
+                                          <p:stCondLst>
+                                            <p:cond delay="1000"/>
+                                          </p:stCondLst>
+                                        </p:cTn>
+                                        <p:tgtEl>
+                                          <p:spTgt spid="117"/>
+                                        </p:tgtEl>
+                                        <p:attrNameLst>
+                                          <p:attrName>style.visibility</p:attrName>
+                                        </p:attrNameLst>
+                                      </p:cBhvr>
+                                      <p:to>
+                                        <p:strVal val="hidden"/>
+                                      </p:to>
+                                    </p:set>
+                                  </p:childTnLst>
+                                </p:cTn>
+                              </p:par>
+                            </p:childTnLst>
+                          </p:cTn>
+                        </p:par>
+                      </p:childTnLst>
+                    </p:cTn>
+                  </p:par>
+                  <p:par>
+                    <p:cTn fill="hold">
+                      <p:stCondLst>
+                        <p:cond delay="indefinite"/>
+                      </p:stCondLst>
+                      <p:childTnLst>
+                        <p:par>
+                          <p:cTn fill="hold">
+                            <p:stCondLst>
+                              <p:cond delay="0"/>
+                            </p:stCondLst>
+                            <p:childTnLst>
+                              <p:par>
+                                <p:cTn fill="hold" nodeType="clickEffect" presetClass="entr" presetID="10" presetSubtype="0">
+                                  <p:stCondLst>
+                                    <p:cond delay="0"/>
+                                  </p:stCondLst>
+                                  <p:childTnLst>
+                                    <p:set>
+                                      <p:cBhvr>
+                                        <p:cTn dur="1" fill="hold">
+                                          <p:stCondLst>
+                                            <p:cond delay="0"/>
+                                          </p:stCondLst>
+                                        </p:cTn>
+                                        <p:tgtEl>
+                                          <p:spTgt spid="118"/>
+                                        </p:tgtEl>
+                                        <p:attrNameLst>
+                                          <p:attrName>style.visibility</p:attrName>
+                                        </p:attrNameLst>
+                                      </p:cBhvr>
+                                      <p:to>
+                                        <p:strVal val="visible"/>
+                                      </p:to>
+                                    </p:set>
+                                    <p:animEffect filter="fade" transition="in">
+                                      <p:cBhvr>
+                                        <p:cTn dur="1000"/>
+                                        <p:tgtEl>
+                                          <p:spTgt spid="118"/>
+                                        </p:tgtEl>
+                                      </p:cBhvr>
+                                    </p:animEffect>
+                                  </p:childTnLst>
+                                </p:cTn>
+                              </p:par>
+                            </p:childTnLst>
+                          </p:cTn>
+                        </p:par>
+                      </p:childTnLst>
+                    </p:cTn>
+                  </p:par>
+                  <p:par>
+                    <p:cTn fill="hold">
+                      <p:stCondLst>
+                        <p:cond delay="indefinite"/>
+                      </p:stCondLst>
+                      <p:childTnLst>
+                        <p:par>
+                          <p:cTn fill="hold">
+                            <p:stCondLst>
+                              <p:cond delay="0"/>
+                            </p:stCondLst>
+                            <p:childTnLst>
+                              <p:par>
+                                <p:cTn fill="hold" nodeType="clickEffect" presetClass="entr" presetID="10" presetSubtype="0">
+                                  <p:stCondLst>
+                                    <p:cond delay="0"/>
+                                  </p:stCondLst>
+                                  <p:childTnLst>
+                                    <p:set>
+                                      <p:cBhvr>
+                                        <p:cTn dur="1" fill="hold">
+                                          <p:stCondLst>
+                                            <p:cond delay="0"/>
+                                          </p:stCondLst>
+                                        </p:cTn>
+                                        <p:tgtEl>
+                                          <p:spTgt spid="119"/>
+                                        </p:tgtEl>
+                                        <p:attrNameLst>
+                                          <p:attrName>style.visibility</p:attrName>
+                                        </p:attrNameLst>
+                                      </p:cBhvr>
+                                      <p:to>
+                                        <p:strVal val="visible"/>
+                                      </p:to>
+                                    </p:set>
+                                    <p:animEffect filter="fade" transition="in">
+                                      <p:cBhvr>
+                                        <p:cTn dur="1000"/>
+                                        <p:tgtEl>
+                                          <p:spTgt spid="119"/>
+                                        </p:tgtEl>
+                                      </p:cBhvr>
+                                    </p:animEffect>
+                                  </p:childTnLst>
+                                </p:cTn>
+                              </p:par>
+                            </p:childTnLst>
+                          </p:cTn>
+                        </p:par>
+                      </p:childTnLst>
+                    </p:cTn>
+                  </p:par>
+                  <p:par>
+                    <p:cTn fill="hold">
+                      <p:stCondLst>
+                        <p:cond delay="indefinite"/>
+                      </p:stCondLst>
+                      <p:childTnLst>
+                        <p:par>
+                          <p:cTn fill="hold">
+                            <p:stCondLst>
+                              <p:cond delay="0"/>
+                            </p:stCondLst>
+                            <p:childTnLst>
+                              <p:par>
+                                <p:cTn fill="hold" nodeType="clickEffect" presetClass="entr" presetID="10" presetSubtype="0">
+                                  <p:stCondLst>
+                                    <p:cond delay="0"/>
+                                  </p:stCondLst>
+                                  <p:childTnLst>
+                                    <p:set>
+                                      <p:cBhvr>
+                                        <p:cTn dur="1" fill="hold">
+                                          <p:stCondLst>
+                                            <p:cond delay="0"/>
+                                          </p:stCondLst>
+                                        </p:cTn>
+                                        <p:tgtEl>
+                                          <p:spTgt spid="120"/>
+                                        </p:tgtEl>
+                                        <p:attrNameLst>
+                                          <p:attrName>style.visibility</p:attrName>
+                                        </p:attrNameLst>
+                                      </p:cBhvr>
+                                      <p:to>
+                                        <p:strVal val="visible"/>
+                                      </p:to>
+                                    </p:set>
+                                    <p:animEffect filter="fade" transition="in">
+                                      <p:cBhvr>
+                                        <p:cTn dur="1000"/>
+                                        <p:tgtEl>
+                                          <p:spTgt spid="120"/>
+                                        </p:tgtEl>
+                                      </p:cBhvr>
+                                    </p:animEffect>
+                                  </p:childTnLst>
+                                </p:cTn>
+                              </p:par>
+                            </p:childTnLst>
+                          </p:cTn>
+                        </p:par>
+                      </p:childTnLst>
+                    </p:cTn>
+                  </p:par>
+                  <p:par>
+                    <p:cTn fill="hold">
+                      <p:stCondLst>
+                        <p:cond delay="indefinite"/>
+                      </p:stCondLst>
+                      <p:childTnLst>
+                        <p:par>
+                          <p:cTn fill="hold">
+                            <p:stCondLst>
+                              <p:cond delay="0"/>
+                            </p:stCondLst>
+                            <p:childTnLst>
+                              <p:par>
+                                <p:cTn fill="hold" nodeType="clickEffect" presetClass="entr" presetID="10" presetSubtype="0">
+                                  <p:stCondLst>
+                                    <p:cond delay="0"/>
+                                  </p:stCondLst>
+                                  <p:childTnLst>
+                                    <p:set>
+                                      <p:cBhvr>
+                                        <p:cTn dur="1" fill="hold">
+                                          <p:stCondLst>
+                                            <p:cond delay="0"/>
+                                          </p:stCondLst>
+                                        </p:cTn>
+                                        <p:tgtEl>
+                                          <p:spTgt spid="121"/>
+                                        </p:tgtEl>
+                                        <p:attrNameLst>
+                                          <p:attrName>style.visibility</p:attrName>
+                                        </p:attrNameLst>
+                                      </p:cBhvr>
+                                      <p:to>
+                                        <p:strVal val="visible"/>
+                                      </p:to>
+                                    </p:set>
+                                    <p:animEffect filter="fade" transition="in">
+                                      <p:cBhvr>
+                                        <p:cTn dur="1000"/>
+                                        <p:tgtEl>
+                                          <p:spTgt spid="121"/>
+                                        </p:tgtEl>
+                                      </p:cBhvr>
+                                    </p:animEffect>
+                                  </p:childTnLst>
+                                </p:cTn>
+                              </p:par>
+                            </p:childTnLst>
+                          </p:cTn>
+                        </p:par>
+                      </p:childTnLst>
+                    </p:cTn>
+                  </p:par>
+                  <p:par>
+                    <p:cTn fill="hold">
+                      <p:stCondLst>
+                        <p:cond delay="indefinite"/>
+                      </p:stCondLst>
+                      <p:childTnLst>
+                        <p:par>
+                          <p:cTn fill="hold">
+                            <p:stCondLst>
+                              <p:cond delay="0"/>
+                            </p:stCondLst>
+                            <p:childTnLst>
+                              <p:par>
+                                <p:cTn fill="hold" nodeType="clickEffect" presetClass="entr" presetID="10" presetSubtype="0">
+                                  <p:stCondLst>
+                                    <p:cond delay="0"/>
+                                  </p:stCondLst>
+                                  <p:childTnLst>
+                                    <p:set>
+                                      <p:cBhvr>
+                                        <p:cTn dur="1" fill="hold">
+                                          <p:stCondLst>
+                                            <p:cond delay="0"/>
+                                          </p:stCondLst>
+                                        </p:cTn>
+                                        <p:tgtEl>
+                                          <p:spTgt spid="122"/>
+                                        </p:tgtEl>
+                                        <p:attrNameLst>
+                                          <p:attrName>style.visibility</p:attrName>
+                                        </p:attrNameLst>
+                                      </p:cBhvr>
+                                      <p:to>
+                                        <p:strVal val="visible"/>
+                                      </p:to>
+                                    </p:set>
+                                    <p:animEffect filter="fade" transition="in">
+                                      <p:cBhvr>
+                                        <p:cTn dur="1000"/>
+                                        <p:tgtEl>
+                                          <p:spTgt spid="122"/>
+                                        </p:tgtEl>
+                                      </p:cBhvr>
+                                    </p:animEffect>
+                                  </p:childTnLst>
+                                </p:cTn>
+                              </p:par>
+                            </p:childTnLst>
+                          </p:cTn>
+                        </p:par>
+                      </p:childTnLst>
+                    </p:cTn>
+                  </p:par>
+                  <p:par>
+                    <p:cTn fill="hold">
+                      <p:stCondLst>
+                        <p:cond delay="indefinite"/>
+                      </p:stCondLst>
+                      <p:childTnLst>
+                        <p:par>
+                          <p:cTn fill="hold">
+                            <p:stCondLst>
+                              <p:cond delay="0"/>
+                            </p:stCondLst>
+                            <p:childTnLst>
+                              <p:par>
+                                <p:cTn fill="hold" nodeType="clickEffect" presetClass="exit" presetID="10" presetSubtype="0">
+                                  <p:stCondLst>
+                                    <p:cond delay="0"/>
+                                  </p:stCondLst>
+                                  <p:childTnLst>
+                                    <p:animEffect filter="fade" transition="out">
+                                      <p:cBhvr>
+                                        <p:cTn dur="1000"/>
+                                        <p:tgtEl>
+                                          <p:spTgt spid="119"/>
+                                        </p:tgtEl>
+                                      </p:cBhvr>
+                                    </p:animEffect>
+                                    <p:set>
+                                      <p:cBhvr>
+                                        <p:cTn dur="1" fill="hold">
+                                          <p:stCondLst>
+                                            <p:cond delay="1000"/>
+                                          </p:stCondLst>
+                                        </p:cTn>
+                                        <p:tgtEl>
+                                          <p:spTgt spid="119"/>
+                                        </p:tgtEl>
+                                        <p:attrNameLst>
+                                          <p:attrName>style.visibility</p:attrName>
+                                        </p:attrNameLst>
+                                      </p:cBhvr>
+                                      <p:to>
+                                        <p:strVal val="hidden"/>
+                                      </p:to>
+                                    </p:set>
+                                  </p:childTnLst>
+                                </p:cTn>
+                              </p:par>
+                              <p:par>
+                                <p:cTn fill="hold" nodeType="withEffect" presetClass="exit" presetID="10" presetSubtype="0">
+                                  <p:stCondLst>
+                                    <p:cond delay="0"/>
+                                  </p:stCondLst>
+                                  <p:childTnLst>
+                                    <p:animEffect filter="fade" transition="out">
+                                      <p:cBhvr>
+                                        <p:cTn dur="1000"/>
+                                        <p:tgtEl>
+                                          <p:spTgt spid="120"/>
+                                        </p:tgtEl>
+                                      </p:cBhvr>
+                                    </p:animEffect>
+                                    <p:set>
+                                      <p:cBhvr>
+                                        <p:cTn dur="1" fill="hold">
+                                          <p:stCondLst>
+                                            <p:cond delay="1000"/>
+                                          </p:stCondLst>
+                                        </p:cTn>
+                                        <p:tgtEl>
+                                          <p:spTgt spid="120"/>
+                                        </p:tgtEl>
+                                        <p:attrNameLst>
+                                          <p:attrName>style.visibility</p:attrName>
+                                        </p:attrNameLst>
+                                      </p:cBhvr>
+                                      <p:to>
+                                        <p:strVal val="hidden"/>
+                                      </p:to>
+                                    </p:set>
+                                  </p:childTnLst>
+                                </p:cTn>
+                              </p:par>
+                              <p:par>
+                                <p:cTn fill="hold" nodeType="withEffect" presetClass="exit" presetID="10" presetSubtype="0">
+                                  <p:stCondLst>
+                                    <p:cond delay="0"/>
+                                  </p:stCondLst>
+                                  <p:childTnLst>
+                                    <p:animEffect filter="fade" transition="out">
+                                      <p:cBhvr>
+                                        <p:cTn dur="1000"/>
+                                        <p:tgtEl>
+                                          <p:spTgt spid="121"/>
+                                        </p:tgtEl>
+                                      </p:cBhvr>
+                                    </p:animEffect>
+                                    <p:set>
+                                      <p:cBhvr>
+                                        <p:cTn dur="1" fill="hold">
+                                          <p:stCondLst>
+                                            <p:cond delay="1000"/>
+                                          </p:stCondLst>
+                                        </p:cTn>
+                                        <p:tgtEl>
+                                          <p:spTgt spid="121"/>
+                                        </p:tgtEl>
+                                        <p:attrNameLst>
+                                          <p:attrName>style.visibility</p:attrName>
+                                        </p:attrNameLst>
+                                      </p:cBhvr>
+                                      <p:to>
+                                        <p:strVal val="hidden"/>
+                                      </p:to>
+                                    </p:set>
+                                  </p:childTnLst>
+                                </p:cTn>
+                              </p:par>
+                              <p:par>
+                                <p:cTn fill="hold" nodeType="withEffect" presetClass="exit" presetID="10" presetSubtype="0">
+                                  <p:stCondLst>
+                                    <p:cond delay="0"/>
+                                  </p:stCondLst>
+                                  <p:childTnLst>
+                                    <p:animEffect filter="fade" transition="out">
+                                      <p:cBhvr>
+                                        <p:cTn dur="1000"/>
+                                        <p:tgtEl>
+                                          <p:spTgt spid="122"/>
+                                        </p:tgtEl>
+                                      </p:cBhvr>
+                                    </p:animEffect>
+                                    <p:set>
+                                      <p:cBhvr>
+                                        <p:cTn dur="1" fill="hold">
+                                          <p:stCondLst>
+                                            <p:cond delay="1000"/>
+                                          </p:stCondLst>
+                                        </p:cTn>
+                                        <p:tgtEl>
+                                          <p:spTgt spid="122"/>
+                                        </p:tgtEl>
+                                        <p:attrNameLst>
+                                          <p:attrName>style.visibility</p:attrName>
+                                        </p:attrNameLst>
+                                      </p:cBhvr>
+                                      <p:to>
+                                        <p:strVal val="hidden"/>
+                                      </p:to>
+                                    </p:set>
+                                  </p:childTnLst>
+                                </p:cTn>
+                              </p:par>
+                              <p:par>
+                                <p:cTn fill="hold" nodeType="withEffect" presetClass="exit" presetID="10" presetSubtype="0">
+                                  <p:stCondLst>
+                                    <p:cond delay="0"/>
+                                  </p:stCondLst>
+                                  <p:childTnLst>
+                                    <p:animEffect filter="fade" transition="out">
+                                      <p:cBhvr>
+                                        <p:cTn dur="1000"/>
+                                        <p:tgtEl>
+                                          <p:spTgt spid="118"/>
+                                        </p:tgtEl>
+                                      </p:cBhvr>
+                                    </p:animEffect>
+                                    <p:set>
+                                      <p:cBhvr>
+                                        <p:cTn dur="1" fill="hold">
+                                          <p:stCondLst>
+                                            <p:cond delay="1000"/>
+                                          </p:stCondLst>
+                                        </p:cTn>
+                                        <p:tgtEl>
+                                          <p:spTgt spid="118"/>
+                                        </p:tgtEl>
+                                        <p:attrNameLst>
+                                          <p:attrName>style.visibility</p:attrName>
+                                        </p:attrNameLst>
+                                      </p:cBhvr>
+                                      <p:to>
+                                        <p:strVal val="hidden"/>
+                                      </p:to>
+                                    </p:set>
+                                  </p:childTnLst>
+                                </p:cTn>
+                              </p:par>
+                            </p:childTnLst>
+                          </p:cTn>
+                        </p:par>
+                      </p:childTnLst>
+                    </p:cTn>
+                  </p:par>
+                  <p:par>
+                    <p:cTn fill="hold">
+                      <p:stCondLst>
+                        <p:cond delay="indefinite"/>
+                      </p:stCondLst>
+                      <p:childTnLst>
+                        <p:par>
+                          <p:cTn fill="hold">
+                            <p:stCondLst>
+                              <p:cond delay="0"/>
+                            </p:stCondLst>
+                            <p:childTnLst>
+                              <p:par>
+                                <p:cTn fill="hold" nodeType="clickEffect" presetClass="entr" presetID="10" presetSubtype="0">
+                                  <p:stCondLst>
+                                    <p:cond delay="0"/>
+                                  </p:stCondLst>
+                                  <p:childTnLst>
+                                    <p:set>
+                                      <p:cBhvr>
+                                        <p:cTn dur="1" fill="hold">
+                                          <p:stCondLst>
+                                            <p:cond delay="0"/>
+                                          </p:stCondLst>
+                                        </p:cTn>
+                                        <p:tgtEl>
+                                          <p:spTgt spid="124"/>
+                                        </p:tgtEl>
+                                        <p:attrNameLst>
+                                          <p:attrName>style.visibility</p:attrName>
+                                        </p:attrNameLst>
+                                      </p:cBhvr>
+                                      <p:to>
+                                        <p:strVal val="visible"/>
+                                      </p:to>
+                                    </p:set>
+                                    <p:animEffect filter="fade" transition="in">
+                                      <p:cBhvr>
+                                        <p:cTn dur="1000"/>
+                                        <p:tgtEl>
+                                          <p:spTgt spid="124"/>
+                                        </p:tgtEl>
+                                      </p:cBhvr>
+                                    </p:animEffect>
+                                  </p:childTnLst>
+                                </p:cTn>
+                              </p:par>
+                            </p:childTnLst>
+                          </p:cTn>
+                        </p:par>
+                      </p:childTnLst>
+                    </p:cTn>
+                  </p:par>
+                  <p:par>
+                    <p:cTn fill="hold">
+                      <p:stCondLst>
+                        <p:cond delay="indefinite"/>
+                      </p:stCondLst>
+                      <p:childTnLst>
+                        <p:par>
+                          <p:cTn fill="hold">
+                            <p:stCondLst>
+                              <p:cond delay="0"/>
+                            </p:stCondLst>
+                            <p:childTnLst>
+                              <p:par>
+                                <p:cTn fill="hold" nodeType="clickEffect" presetClass="entr" presetID="10" presetSubtype="0">
+                                  <p:stCondLst>
+                                    <p:cond delay="0"/>
+                                  </p:stCondLst>
+                                  <p:childTnLst>
+                                    <p:set>
+                                      <p:cBhvr>
+                                        <p:cTn dur="1" fill="hold">
+                                          <p:stCondLst>
+                                            <p:cond delay="0"/>
+                                          </p:stCondLst>
+                                        </p:cTn>
+                                        <p:tgtEl>
+                                          <p:spTgt spid="125"/>
+                                        </p:tgtEl>
+                                        <p:attrNameLst>
+                                          <p:attrName>style.visibility</p:attrName>
+                                        </p:attrNameLst>
+                                      </p:cBhvr>
+                                      <p:to>
+                                        <p:strVal val="visible"/>
+                                      </p:to>
+                                    </p:set>
+                                    <p:animEffect filter="fade" transition="in">
+                                      <p:cBhvr>
+                                        <p:cTn dur="1000"/>
+                                        <p:tgtEl>
+                                          <p:spTgt spid="125"/>
+                                        </p:tgtEl>
+                                      </p:cBhvr>
+                                    </p:animEffect>
+                                  </p:childTnLst>
+                                </p:cTn>
+                              </p:par>
+                            </p:childTnLst>
+                          </p:cTn>
+                        </p:par>
+                      </p:childTnLst>
+                    </p:cTn>
+                  </p:par>
+                  <p:par>
+                    <p:cTn fill="hold">
+                      <p:stCondLst>
+                        <p:cond delay="indefinite"/>
+                      </p:stCondLst>
+                      <p:childTnLst>
+                        <p:par>
+                          <p:cTn fill="hold">
+                            <p:stCondLst>
+                              <p:cond delay="0"/>
+                            </p:stCondLst>
+                            <p:childTnLst>
+                              <p:par>
+                                <p:cTn fill="hold" nodeType="clickEffect" presetClass="entr" presetID="10" presetSubtype="0">
+                                  <p:stCondLst>
+                                    <p:cond delay="0"/>
+                                  </p:stCondLst>
+                                  <p:childTnLst>
+                                    <p:set>
+                                      <p:cBhvr>
+                                        <p:cTn dur="1" fill="hold">
+                                          <p:stCondLst>
+                                            <p:cond delay="0"/>
+                                          </p:stCondLst>
+                                        </p:cTn>
+                                        <p:tgtEl>
+                                          <p:spTgt spid="126"/>
+                                        </p:tgtEl>
+                                        <p:attrNameLst>
+                                          <p:attrName>style.visibility</p:attrName>
+                                        </p:attrNameLst>
+                                      </p:cBhvr>
+                                      <p:to>
+                                        <p:strVal val="visible"/>
+                                      </p:to>
+                                    </p:set>
+                                    <p:animEffect filter="fade" transition="in">
+                                      <p:cBhvr>
+                                        <p:cTn dur="1000"/>
+                                        <p:tgtEl>
+                                          <p:spTgt spid="126"/>
+                                        </p:tgtEl>
+                                      </p:cBhvr>
+                                    </p:animEffect>
+                                  </p:childTnLst>
+                                </p:cTn>
+                              </p:par>
+                            </p:childTnLst>
+                          </p:cTn>
+                        </p:par>
+                      </p:childTnLst>
+                    </p:cTn>
+                  </p:par>
+                  <p:par>
+                    <p:cTn fill="hold">
+                      <p:stCondLst>
+                        <p:cond delay="indefinite"/>
+                      </p:stCondLst>
+                      <p:childTnLst>
+                        <p:par>
+                          <p:cTn fill="hold">
+                            <p:stCondLst>
+                              <p:cond delay="0"/>
+                            </p:stCondLst>
+                            <p:childTnLst>
+                              <p:par>
+                                <p:cTn fill="hold" nodeType="clickEffect" presetClass="entr" presetID="10" presetSubtype="0">
+                                  <p:stCondLst>
+                                    <p:cond delay="0"/>
+                                  </p:stCondLst>
+                                  <p:childTnLst>
+                                    <p:set>
+                                      <p:cBhvr>
+                                        <p:cTn dur="1" fill="hold">
+                                          <p:stCondLst>
+                                            <p:cond delay="0"/>
+                                          </p:stCondLst>
+                                        </p:cTn>
+                                        <p:tgtEl>
+                                          <p:spTgt spid="127"/>
+                                        </p:tgtEl>
+                                        <p:attrNameLst>
+                                          <p:attrName>style.visibility</p:attrName>
+                                        </p:attrNameLst>
+                                      </p:cBhvr>
+                                      <p:to>
+                                        <p:strVal val="visible"/>
+                                      </p:to>
+                                    </p:set>
+                                    <p:animEffect filter="fade" transition="in">
+                                      <p:cBhvr>
+                                        <p:cTn dur="1000"/>
+                                        <p:tgtEl>
+                                          <p:spTgt spid="127"/>
+                                        </p:tgtEl>
+                                      </p:cBhvr>
+                                    </p:animEffect>
+                                  </p:childTnLst>
+                                </p:cTn>
+                              </p:par>
+                            </p:childTnLst>
+                          </p:cTn>
+                        </p:par>
+                      </p:childTnLst>
+                    </p:cTn>
+                  </p:par>
+                </p:childTnLst>
+              </p:cTn>
+              <p:prevCondLst>
+                <p:cond evt="onPrev">
+                  <p:tgtEl>
+                    <p:sldTgt/>
+                  </p:tgtEl>
+                </p:cond>
+              </p:prevCondLst>
+              <p:nextCondLst>
+                <p:cond evt="onNext">
+                  <p:tgtEl>
+                    <p:sldTgt/>
+                  </p:tgtEl>
+                </p:cond>
+              </p:nextCondLst>
+            </p:seq>
+          </p:childTnLst>
+        </p:cTn>
+      </p:par>
+    </p:tnLst>
+  </p:timing>
 </p:sld>
 </file>
 
@@ -8899,7 +10677,7 @@
   <p:cSld>
     <p:spTree>
       <p:nvGrpSpPr>
-        <p:cNvPr id="117" name="Shape 117"/>
+        <p:cNvPr id="131" name="Shape 131"/>
         <p:cNvGrpSpPr/>
         <p:nvPr/>
       </p:nvGrpSpPr>
@@ -8913,7 +10691,7 @@
       </p:grpSpPr>
       <p:sp>
         <p:nvSpPr>
-          <p:cNvPr id="118" name="Google Shape;118;p19"/>
+          <p:cNvPr id="132" name="Google Shape;132;p19"/>
           <p:cNvSpPr/>
           <p:nvPr/>
         </p:nvSpPr>
@@ -8979,7 +10757,7 @@
       </p:sp>
       <p:sp>
         <p:nvSpPr>
-          <p:cNvPr id="119" name="Google Shape;119;p19"/>
+          <p:cNvPr id="133" name="Google Shape;133;p19"/>
           <p:cNvSpPr/>
           <p:nvPr/>
         </p:nvSpPr>
@@ -9037,7 +10815,7 @@
       </p:sp>
       <p:sp>
         <p:nvSpPr>
-          <p:cNvPr id="120" name="Google Shape;120;p19"/>
+          <p:cNvPr id="134" name="Google Shape;134;p19"/>
           <p:cNvSpPr/>
           <p:nvPr/>
         </p:nvSpPr>
@@ -9096,7 +10874,7 @@
       </p:sp>
       <p:sp>
         <p:nvSpPr>
-          <p:cNvPr id="121" name="Google Shape;121;p19"/>
+          <p:cNvPr id="135" name="Google Shape;135;p19"/>
           <p:cNvSpPr/>
           <p:nvPr/>
         </p:nvSpPr>
@@ -9154,7 +10932,7 @@
       </p:sp>
       <p:pic>
         <p:nvPicPr>
-          <p:cNvPr id="122" name="Google Shape;122;p19"/>
+          <p:cNvPr id="136" name="Google Shape;136;p19"/>
           <p:cNvPicPr preferRelativeResize="0"/>
           <p:nvPr/>
         </p:nvPicPr>
@@ -9182,7 +10960,7 @@
       </p:pic>
       <p:pic>
         <p:nvPicPr>
-          <p:cNvPr id="123" name="Google Shape;123;p19"/>
+          <p:cNvPr id="137" name="Google Shape;137;p19"/>
           <p:cNvPicPr preferRelativeResize="0"/>
           <p:nvPr/>
         </p:nvPicPr>
@@ -9221,7 +10999,7 @@
   <p:cSld>
     <p:spTree>
       <p:nvGrpSpPr>
-        <p:cNvPr id="127" name="Shape 127"/>
+        <p:cNvPr id="141" name="Shape 141"/>
         <p:cNvGrpSpPr/>
         <p:nvPr/>
       </p:nvGrpSpPr>
@@ -9235,7 +11013,7 @@
       </p:grpSpPr>
       <p:sp>
         <p:nvSpPr>
-          <p:cNvPr id="128" name="Google Shape;128;p20"/>
+          <p:cNvPr id="142" name="Google Shape;142;p20"/>
           <p:cNvSpPr/>
           <p:nvPr/>
         </p:nvSpPr>
@@ -9301,7 +11079,7 @@
       </p:sp>
       <p:sp>
         <p:nvSpPr>
-          <p:cNvPr id="129" name="Google Shape;129;p20"/>
+          <p:cNvPr id="143" name="Google Shape;143;p20"/>
           <p:cNvSpPr/>
           <p:nvPr/>
         </p:nvSpPr>
@@ -9371,7 +11149,7 @@
       </p:sp>
       <p:sp>
         <p:nvSpPr>
-          <p:cNvPr id="130" name="Google Shape;130;p20"/>
+          <p:cNvPr id="144" name="Google Shape;144;p20"/>
           <p:cNvSpPr/>
           <p:nvPr/>
         </p:nvSpPr>
@@ -9430,7 +11208,7 @@
       </p:sp>
       <p:sp>
         <p:nvSpPr>
-          <p:cNvPr id="131" name="Google Shape;131;p20"/>
+          <p:cNvPr id="145" name="Google Shape;145;p20"/>
           <p:cNvSpPr/>
           <p:nvPr/>
         </p:nvSpPr>
@@ -9488,7 +11266,7 @@
       </p:sp>
       <p:pic>
         <p:nvPicPr>
-          <p:cNvPr id="132" name="Google Shape;132;p20"/>
+          <p:cNvPr id="146" name="Google Shape;146;p20"/>
           <p:cNvPicPr preferRelativeResize="0"/>
           <p:nvPr/>
         </p:nvPicPr>
@@ -9516,7 +11294,7 @@
       </p:pic>
       <p:pic>
         <p:nvPicPr>
-          <p:cNvPr id="133" name="Google Shape;133;p20"/>
+          <p:cNvPr id="147" name="Google Shape;147;p20"/>
           <p:cNvPicPr preferRelativeResize="0"/>
           <p:nvPr/>
         </p:nvPicPr>
@@ -9555,7 +11333,7 @@
   <p:cSld>
     <p:spTree>
       <p:nvGrpSpPr>
-        <p:cNvPr id="137" name="Shape 137"/>
+        <p:cNvPr id="151" name="Shape 151"/>
         <p:cNvGrpSpPr/>
         <p:nvPr/>
       </p:nvGrpSpPr>
@@ -9569,7 +11347,7 @@
       </p:grpSpPr>
       <p:sp>
         <p:nvSpPr>
-          <p:cNvPr id="138" name="Google Shape;138;p21"/>
+          <p:cNvPr id="152" name="Google Shape;152;p21"/>
           <p:cNvSpPr/>
           <p:nvPr/>
         </p:nvSpPr>
@@ -9635,7 +11413,7 @@
       </p:sp>
       <p:sp>
         <p:nvSpPr>
-          <p:cNvPr id="139" name="Google Shape;139;p21"/>
+          <p:cNvPr id="153" name="Google Shape;153;p21"/>
           <p:cNvSpPr/>
           <p:nvPr/>
         </p:nvSpPr>
@@ -9693,7 +11471,7 @@
       </p:sp>
       <p:sp>
         <p:nvSpPr>
-          <p:cNvPr id="140" name="Google Shape;140;p21"/>
+          <p:cNvPr id="154" name="Google Shape;154;p21"/>
           <p:cNvSpPr/>
           <p:nvPr/>
         </p:nvSpPr>
@@ -9752,7 +11530,7 @@
       </p:sp>
       <p:sp>
         <p:nvSpPr>
-          <p:cNvPr id="141" name="Google Shape;141;p21"/>
+          <p:cNvPr id="155" name="Google Shape;155;p21"/>
           <p:cNvSpPr/>
           <p:nvPr/>
         </p:nvSpPr>
@@ -9810,7 +11588,7 @@
       </p:sp>
       <p:pic>
         <p:nvPicPr>
-          <p:cNvPr id="142" name="Google Shape;142;p21"/>
+          <p:cNvPr id="156" name="Google Shape;156;p21"/>
           <p:cNvPicPr preferRelativeResize="0"/>
           <p:nvPr/>
         </p:nvPicPr>
@@ -9838,7 +11616,7 @@
       </p:pic>
       <p:sp>
         <p:nvSpPr>
-          <p:cNvPr id="143" name="Google Shape;143;p21"/>
+          <p:cNvPr id="157" name="Google Shape;157;p21"/>
           <p:cNvSpPr txBox="1"/>
           <p:nvPr/>
         </p:nvSpPr>
@@ -9903,7 +11681,7 @@
       </p:sp>
       <p:sp>
         <p:nvSpPr>
-          <p:cNvPr id="144" name="Google Shape;144;p21"/>
+          <p:cNvPr id="158" name="Google Shape;158;p21"/>
           <p:cNvSpPr txBox="1"/>
           <p:nvPr/>
         </p:nvSpPr>
@@ -9986,7 +11764,7 @@
       </p:sp>
       <p:sp>
         <p:nvSpPr>
-          <p:cNvPr id="145" name="Google Shape;145;p21"/>
+          <p:cNvPr id="159" name="Google Shape;159;p21"/>
           <p:cNvSpPr txBox="1"/>
           <p:nvPr/>
         </p:nvSpPr>
@@ -10177,7 +11955,7 @@
                                           </p:stCondLst>
                                         </p:cTn>
                                         <p:tgtEl>
-                                          <p:spTgt spid="143"/>
+                                          <p:spTgt spid="157"/>
                                         </p:tgtEl>
                                         <p:attrNameLst>
                                           <p:attrName>style.visibility</p:attrName>
@@ -10191,7 +11969,7 @@
                                       <p:cBhvr>
                                         <p:cTn dur="1000"/>
                                         <p:tgtEl>
-                                          <p:spTgt spid="143"/>
+                                          <p:spTgt spid="157"/>
                                         </p:tgtEl>
                                       </p:cBhvr>
                                     </p:animEffect>
@@ -10230,7 +12008,7 @@
                                           </p:stCondLst>
                                         </p:cTn>
                                         <p:tgtEl>
-                                          <p:spTgt spid="144"/>
+                                          <p:spTgt spid="158"/>
                                         </p:tgtEl>
                                         <p:attrNameLst>
                                           <p:attrName>style.visibility</p:attrName>
@@ -10244,7 +12022,7 @@
                                       <p:cBhvr>
                                         <p:cTn dur="1000"/>
                                         <p:tgtEl>
-                                          <p:spTgt spid="144"/>
+                                          <p:spTgt spid="158"/>
                                         </p:tgtEl>
                                       </p:cBhvr>
                                     </p:animEffect>
@@ -10283,7 +12061,7 @@
                                           </p:stCondLst>
                                         </p:cTn>
                                         <p:tgtEl>
-                                          <p:spTgt spid="145"/>
+                                          <p:spTgt spid="159"/>
                                         </p:tgtEl>
                                         <p:attrNameLst>
                                           <p:attrName>style.visibility</p:attrName>
@@ -10297,7 +12075,7 @@
                                       <p:cBhvr>
                                         <p:cTn dur="1000"/>
                                         <p:tgtEl>
-                                          <p:spTgt spid="145"/>
+                                          <p:spTgt spid="159"/>
                                         </p:tgtEl>
                                       </p:cBhvr>
                                     </p:animEffect>

</xml_diff>